<commit_message>
Update The Code For Inferencing Gemma2 Model
</commit_message>
<xml_diff>
--- a/Slides/Symbol Tuning.pptx
+++ b/Slides/Symbol Tuning.pptx
@@ -5,7 +5,7 @@
     <p:sldMasterId id="2147483648" r:id="rId1"/>
   </p:sldMasterIdLst>
   <p:notesMasterIdLst>
-    <p:notesMasterId r:id="rId47"/>
+    <p:notesMasterId r:id="rId48"/>
   </p:notesMasterIdLst>
   <p:sldIdLst>
     <p:sldId id="276" r:id="rId2"/>
@@ -53,6 +53,7 @@
     <p:sldId id="318" r:id="rId44"/>
     <p:sldId id="319" r:id="rId45"/>
     <p:sldId id="320" r:id="rId46"/>
+    <p:sldId id="321" r:id="rId47"/>
   </p:sldIdLst>
   <p:sldSz cx="12192000" cy="6858000"/>
   <p:notesSz cx="6858000" cy="9144000"/>
@@ -7666,7 +7667,7 @@
           <a:p>
             <a:fld id="{90EA4D55-0F48-48F2-8B8B-CD81BA2373CB}" type="datetimeFigureOut">
               <a:rPr lang="en-US" smtClean="0"/>
-              <a:t>05-Aug-24</a:t>
+              <a:t>12-Aug-24</a:t>
             </a:fld>
             <a:endParaRPr lang="en-US"/>
           </a:p>
@@ -11209,6 +11210,90 @@
 </p:notes>
 </file>
 
+<file path=ppt/notesSlides/notesSlide45.xml><?xml version="1.0" encoding="utf-8"?>
+<p:notes xmlns:a="http://schemas.openxmlformats.org/drawingml/2006/main" xmlns:r="http://schemas.openxmlformats.org/officeDocument/2006/relationships" xmlns:p="http://schemas.openxmlformats.org/presentationml/2006/main">
+  <p:cSld>
+    <p:spTree>
+      <p:nvGrpSpPr>
+        <p:cNvPr id="1" name=""/>
+        <p:cNvGrpSpPr/>
+        <p:nvPr/>
+      </p:nvGrpSpPr>
+      <p:grpSpPr>
+        <a:xfrm>
+          <a:off x="0" y="0"/>
+          <a:ext cx="0" cy="0"/>
+          <a:chOff x="0" y="0"/>
+          <a:chExt cx="0" cy="0"/>
+        </a:xfrm>
+      </p:grpSpPr>
+      <p:sp>
+        <p:nvSpPr>
+          <p:cNvPr id="2" name="Slide Image Placeholder 1"/>
+          <p:cNvSpPr>
+            <a:spLocks noGrp="1" noRot="1" noChangeAspect="1"/>
+          </p:cNvSpPr>
+          <p:nvPr>
+            <p:ph type="sldImg"/>
+          </p:nvPr>
+        </p:nvSpPr>
+        <p:spPr/>
+      </p:sp>
+      <p:sp>
+        <p:nvSpPr>
+          <p:cNvPr id="3" name="Notes Placeholder 2"/>
+          <p:cNvSpPr>
+            <a:spLocks noGrp="1"/>
+          </p:cNvSpPr>
+          <p:nvPr>
+            <p:ph type="body" idx="1"/>
+          </p:nvPr>
+        </p:nvSpPr>
+        <p:spPr/>
+        <p:txBody>
+          <a:bodyPr/>
+          <a:lstStyle/>
+          <a:p>
+            <a:endParaRPr lang="en-US" dirty="0"/>
+          </a:p>
+        </p:txBody>
+      </p:sp>
+      <p:sp>
+        <p:nvSpPr>
+          <p:cNvPr id="4" name="Slide Number Placeholder 3"/>
+          <p:cNvSpPr>
+            <a:spLocks noGrp="1"/>
+          </p:cNvSpPr>
+          <p:nvPr>
+            <p:ph type="sldNum" sz="quarter" idx="5"/>
+          </p:nvPr>
+        </p:nvSpPr>
+        <p:spPr/>
+        <p:txBody>
+          <a:bodyPr/>
+          <a:lstStyle/>
+          <a:p>
+            <a:fld id="{3E4A7109-D3E0-47BA-A045-9A99591D35D8}" type="slidenum">
+              <a:rPr lang="en-US" smtClean="0"/>
+              <a:t>46</a:t>
+            </a:fld>
+            <a:endParaRPr lang="en-US"/>
+          </a:p>
+        </p:txBody>
+      </p:sp>
+    </p:spTree>
+    <p:extLst>
+      <p:ext uri="{BB962C8B-B14F-4D97-AF65-F5344CB8AC3E}">
+        <p14:creationId xmlns:p14="http://schemas.microsoft.com/office/powerpoint/2010/main" val="233658564"/>
+      </p:ext>
+    </p:extLst>
+  </p:cSld>
+  <p:clrMapOvr>
+    <a:masterClrMapping/>
+  </p:clrMapOvr>
+</p:notes>
+</file>
+
 <file path=ppt/notesSlides/notesSlide5.xml><?xml version="1.0" encoding="utf-8"?>
 <p:notes xmlns:a="http://schemas.openxmlformats.org/drawingml/2006/main" xmlns:r="http://schemas.openxmlformats.org/officeDocument/2006/relationships" xmlns:p="http://schemas.openxmlformats.org/presentationml/2006/main">
   <p:cSld>
@@ -11776,7 +11861,7 @@
           <a:p>
             <a:fld id="{B8959F3C-9879-4806-ADC7-BA321CD3F53D}" type="datetimeFigureOut">
               <a:rPr lang="en-US" smtClean="0"/>
-              <a:t>05-Aug-24</a:t>
+              <a:t>12-Aug-24</a:t>
             </a:fld>
             <a:endParaRPr lang="en-US"/>
           </a:p>
@@ -11974,7 +12059,7 @@
           <a:p>
             <a:fld id="{B8959F3C-9879-4806-ADC7-BA321CD3F53D}" type="datetimeFigureOut">
               <a:rPr lang="en-US" smtClean="0"/>
-              <a:t>05-Aug-24</a:t>
+              <a:t>12-Aug-24</a:t>
             </a:fld>
             <a:endParaRPr lang="en-US"/>
           </a:p>
@@ -12182,7 +12267,7 @@
           <a:p>
             <a:fld id="{B8959F3C-9879-4806-ADC7-BA321CD3F53D}" type="datetimeFigureOut">
               <a:rPr lang="en-US" smtClean="0"/>
-              <a:t>05-Aug-24</a:t>
+              <a:t>12-Aug-24</a:t>
             </a:fld>
             <a:endParaRPr lang="en-US"/>
           </a:p>
@@ -12380,7 +12465,7 @@
           <a:p>
             <a:fld id="{B8959F3C-9879-4806-ADC7-BA321CD3F53D}" type="datetimeFigureOut">
               <a:rPr lang="en-US" smtClean="0"/>
-              <a:t>05-Aug-24</a:t>
+              <a:t>12-Aug-24</a:t>
             </a:fld>
             <a:endParaRPr lang="en-US"/>
           </a:p>
@@ -12655,7 +12740,7 @@
           <a:p>
             <a:fld id="{B8959F3C-9879-4806-ADC7-BA321CD3F53D}" type="datetimeFigureOut">
               <a:rPr lang="en-US" smtClean="0"/>
-              <a:t>05-Aug-24</a:t>
+              <a:t>12-Aug-24</a:t>
             </a:fld>
             <a:endParaRPr lang="en-US"/>
           </a:p>
@@ -12920,7 +13005,7 @@
           <a:p>
             <a:fld id="{B8959F3C-9879-4806-ADC7-BA321CD3F53D}" type="datetimeFigureOut">
               <a:rPr lang="en-US" smtClean="0"/>
-              <a:t>05-Aug-24</a:t>
+              <a:t>12-Aug-24</a:t>
             </a:fld>
             <a:endParaRPr lang="en-US"/>
           </a:p>
@@ -13332,7 +13417,7 @@
           <a:p>
             <a:fld id="{B8959F3C-9879-4806-ADC7-BA321CD3F53D}" type="datetimeFigureOut">
               <a:rPr lang="en-US" smtClean="0"/>
-              <a:t>05-Aug-24</a:t>
+              <a:t>12-Aug-24</a:t>
             </a:fld>
             <a:endParaRPr lang="en-US"/>
           </a:p>
@@ -13473,7 +13558,7 @@
           <a:p>
             <a:fld id="{B8959F3C-9879-4806-ADC7-BA321CD3F53D}" type="datetimeFigureOut">
               <a:rPr lang="en-US" smtClean="0"/>
-              <a:t>05-Aug-24</a:t>
+              <a:t>12-Aug-24</a:t>
             </a:fld>
             <a:endParaRPr lang="en-US"/>
           </a:p>
@@ -13586,7 +13671,7 @@
           <a:p>
             <a:fld id="{B8959F3C-9879-4806-ADC7-BA321CD3F53D}" type="datetimeFigureOut">
               <a:rPr lang="en-US" smtClean="0"/>
-              <a:t>05-Aug-24</a:t>
+              <a:t>12-Aug-24</a:t>
             </a:fld>
             <a:endParaRPr lang="en-US"/>
           </a:p>
@@ -13897,7 +13982,7 @@
           <a:p>
             <a:fld id="{B8959F3C-9879-4806-ADC7-BA321CD3F53D}" type="datetimeFigureOut">
               <a:rPr lang="en-US" smtClean="0"/>
-              <a:t>05-Aug-24</a:t>
+              <a:t>12-Aug-24</a:t>
             </a:fld>
             <a:endParaRPr lang="en-US"/>
           </a:p>
@@ -14185,7 +14270,7 @@
           <a:p>
             <a:fld id="{B8959F3C-9879-4806-ADC7-BA321CD3F53D}" type="datetimeFigureOut">
               <a:rPr lang="en-US" smtClean="0"/>
-              <a:t>05-Aug-24</a:t>
+              <a:t>12-Aug-24</a:t>
             </a:fld>
             <a:endParaRPr lang="en-US"/>
           </a:p>
@@ -14426,7 +14511,7 @@
           <a:p>
             <a:fld id="{B8959F3C-9879-4806-ADC7-BA321CD3F53D}" type="datetimeFigureOut">
               <a:rPr lang="en-US" smtClean="0"/>
-              <a:t>05-Aug-24</a:t>
+              <a:t>12-Aug-24</a:t>
             </a:fld>
             <a:endParaRPr lang="en-US"/>
           </a:p>
@@ -30716,6 +30801,122 @@
     <p:extLst>
       <p:ext uri="{BB962C8B-B14F-4D97-AF65-F5344CB8AC3E}">
         <p14:creationId xmlns:p14="http://schemas.microsoft.com/office/powerpoint/2010/main" val="346205950"/>
+      </p:ext>
+    </p:extLst>
+  </p:cSld>
+  <p:clrMapOvr>
+    <a:masterClrMapping/>
+  </p:clrMapOvr>
+</p:sld>
+</file>
+
+<file path=ppt/slides/slide46.xml><?xml version="1.0" encoding="utf-8"?>
+<p:sld xmlns:a="http://schemas.openxmlformats.org/drawingml/2006/main" xmlns:r="http://schemas.openxmlformats.org/officeDocument/2006/relationships" xmlns:p="http://schemas.openxmlformats.org/presentationml/2006/main">
+  <p:cSld>
+    <p:spTree>
+      <p:nvGrpSpPr>
+        <p:cNvPr id="1" name=""/>
+        <p:cNvGrpSpPr/>
+        <p:nvPr/>
+      </p:nvGrpSpPr>
+      <p:grpSpPr>
+        <a:xfrm>
+          <a:off x="0" y="0"/>
+          <a:ext cx="0" cy="0"/>
+          <a:chOff x="0" y="0"/>
+          <a:chExt cx="0" cy="0"/>
+        </a:xfrm>
+      </p:grpSpPr>
+      <p:sp>
+        <p:nvSpPr>
+          <p:cNvPr id="2" name="Title 1">
+            <a:extLst>
+              <a:ext uri="{FF2B5EF4-FFF2-40B4-BE49-F238E27FC236}">
+                <a16:creationId xmlns:a16="http://schemas.microsoft.com/office/drawing/2014/main" id="{1F8717B5-F992-3362-0E17-84D889214116}"/>
+              </a:ext>
+            </a:extLst>
+          </p:cNvPr>
+          <p:cNvSpPr>
+            <a:spLocks noGrp="1"/>
+          </p:cNvSpPr>
+          <p:nvPr>
+            <p:ph type="title"/>
+          </p:nvPr>
+        </p:nvSpPr>
+        <p:spPr/>
+        <p:txBody>
+          <a:bodyPr>
+            <a:normAutofit/>
+          </a:bodyPr>
+          <a:lstStyle/>
+          <a:p>
+            <a:r>
+              <a:rPr lang="en-US" sz="2400" b="1" dirty="0"/>
+              <a:t>Symbol tuning Gemma-7b-it</a:t>
+            </a:r>
+          </a:p>
+        </p:txBody>
+      </p:sp>
+      <p:sp>
+        <p:nvSpPr>
+          <p:cNvPr id="3" name="Content Placeholder 2">
+            <a:extLst>
+              <a:ext uri="{FF2B5EF4-FFF2-40B4-BE49-F238E27FC236}">
+                <a16:creationId xmlns:a16="http://schemas.microsoft.com/office/drawing/2014/main" id="{6A1CF6AE-4BFF-FA1F-6998-093945033E5D}"/>
+              </a:ext>
+            </a:extLst>
+          </p:cNvPr>
+          <p:cNvSpPr>
+            <a:spLocks noGrp="1"/>
+          </p:cNvSpPr>
+          <p:nvPr>
+            <p:ph idx="1"/>
+          </p:nvPr>
+        </p:nvSpPr>
+        <p:spPr/>
+        <p:txBody>
+          <a:bodyPr>
+            <a:normAutofit/>
+          </a:bodyPr>
+          <a:lstStyle/>
+          <a:p>
+            <a:r>
+              <a:rPr lang="en-US" sz="1800" dirty="0"/>
+              <a:t>Now we tested Gemma-7b-it model with the version 2 prompt and the results is illustrated in the following slides.</a:t>
+            </a:r>
+          </a:p>
+          <a:p>
+            <a:r>
+              <a:rPr lang="en-US" sz="1800" dirty="0"/>
+              <a:t>One thing to note is that this model  doesn’t response to our prompt with just one label of ‘47’ or ’58’, instead it responded with a sentence to explain why it is detecting what label.</a:t>
+            </a:r>
+            <a:endParaRPr lang="en-US" sz="1400" dirty="0"/>
+          </a:p>
+          <a:p>
+            <a:pPr lvl="1"/>
+            <a:r>
+              <a:rPr lang="en-US" sz="1400" dirty="0"/>
+              <a:t>For </a:t>
+            </a:r>
+            <a:r>
+              <a:rPr lang="en-US" sz="1400"/>
+              <a:t>this reason, </a:t>
+            </a:r>
+            <a:r>
+              <a:rPr lang="en-US" sz="1400" dirty="0"/>
+              <a:t>we just extract the first number from response and save it as the </a:t>
+            </a:r>
+            <a:r>
+              <a:rPr lang="en-US" sz="1400"/>
+              <a:t>final result.</a:t>
+            </a:r>
+          </a:p>
+        </p:txBody>
+      </p:sp>
+    </p:spTree>
+    <p:extLst>
+      <p:ext uri="{BB962C8B-B14F-4D97-AF65-F5344CB8AC3E}">
+        <p14:creationId xmlns:p14="http://schemas.microsoft.com/office/powerpoint/2010/main" val="3470536822"/>
       </p:ext>
     </p:extLst>
   </p:cSld>

</xml_diff>

<commit_message>
Add System-User Prompt & Result
</commit_message>
<xml_diff>
--- a/Slides/Symbol Tuning.pptx
+++ b/Slides/Symbol Tuning.pptx
@@ -5,7 +5,7 @@
     <p:sldMasterId id="2147483648" r:id="rId1"/>
   </p:sldMasterIdLst>
   <p:notesMasterIdLst>
-    <p:notesMasterId r:id="rId63"/>
+    <p:notesMasterId r:id="rId69"/>
   </p:notesMasterIdLst>
   <p:sldIdLst>
     <p:sldId id="276" r:id="rId2"/>
@@ -69,6 +69,12 @@
     <p:sldId id="330" r:id="rId60"/>
     <p:sldId id="331" r:id="rId61"/>
     <p:sldId id="336" r:id="rId62"/>
+    <p:sldId id="337" r:id="rId63"/>
+    <p:sldId id="338" r:id="rId64"/>
+    <p:sldId id="339" r:id="rId65"/>
+    <p:sldId id="340" r:id="rId66"/>
+    <p:sldId id="341" r:id="rId67"/>
+    <p:sldId id="342" r:id="rId68"/>
   </p:sldIdLst>
   <p:sldSz cx="12192000" cy="6858000"/>
   <p:notesSz cx="6858000" cy="9144000"/>
@@ -9828,7 +9834,7 @@
           <a:p>
             <a:fld id="{90EA4D55-0F48-48F2-8B8B-CD81BA2373CB}" type="datetimeFigureOut">
               <a:rPr lang="en-US" smtClean="0"/>
-              <a:t>12-Aug-24</a:t>
+              <a:t>15-Aug-24</a:t>
             </a:fld>
             <a:endParaRPr lang="en-US"/>
           </a:p>
@@ -14883,6 +14889,510 @@
 </p:notes>
 </file>
 
+<file path=ppt/notesSlides/notesSlide61.xml><?xml version="1.0" encoding="utf-8"?>
+<p:notes xmlns:a="http://schemas.openxmlformats.org/drawingml/2006/main" xmlns:r="http://schemas.openxmlformats.org/officeDocument/2006/relationships" xmlns:p="http://schemas.openxmlformats.org/presentationml/2006/main">
+  <p:cSld>
+    <p:spTree>
+      <p:nvGrpSpPr>
+        <p:cNvPr id="1" name=""/>
+        <p:cNvGrpSpPr/>
+        <p:nvPr/>
+      </p:nvGrpSpPr>
+      <p:grpSpPr>
+        <a:xfrm>
+          <a:off x="0" y="0"/>
+          <a:ext cx="0" cy="0"/>
+          <a:chOff x="0" y="0"/>
+          <a:chExt cx="0" cy="0"/>
+        </a:xfrm>
+      </p:grpSpPr>
+      <p:sp>
+        <p:nvSpPr>
+          <p:cNvPr id="2" name="Slide Image Placeholder 1"/>
+          <p:cNvSpPr>
+            <a:spLocks noGrp="1" noRot="1" noChangeAspect="1"/>
+          </p:cNvSpPr>
+          <p:nvPr>
+            <p:ph type="sldImg"/>
+          </p:nvPr>
+        </p:nvSpPr>
+        <p:spPr/>
+      </p:sp>
+      <p:sp>
+        <p:nvSpPr>
+          <p:cNvPr id="3" name="Notes Placeholder 2"/>
+          <p:cNvSpPr>
+            <a:spLocks noGrp="1"/>
+          </p:cNvSpPr>
+          <p:nvPr>
+            <p:ph type="body" idx="1"/>
+          </p:nvPr>
+        </p:nvSpPr>
+        <p:spPr/>
+        <p:txBody>
+          <a:bodyPr/>
+          <a:lstStyle/>
+          <a:p>
+            <a:endParaRPr lang="en-US" dirty="0"/>
+          </a:p>
+        </p:txBody>
+      </p:sp>
+      <p:sp>
+        <p:nvSpPr>
+          <p:cNvPr id="4" name="Slide Number Placeholder 3"/>
+          <p:cNvSpPr>
+            <a:spLocks noGrp="1"/>
+          </p:cNvSpPr>
+          <p:nvPr>
+            <p:ph type="sldNum" sz="quarter" idx="5"/>
+          </p:nvPr>
+        </p:nvSpPr>
+        <p:spPr/>
+        <p:txBody>
+          <a:bodyPr/>
+          <a:lstStyle/>
+          <a:p>
+            <a:fld id="{3E4A7109-D3E0-47BA-A045-9A99591D35D8}" type="slidenum">
+              <a:rPr lang="en-US" smtClean="0"/>
+              <a:t>62</a:t>
+            </a:fld>
+            <a:endParaRPr lang="en-US"/>
+          </a:p>
+        </p:txBody>
+      </p:sp>
+    </p:spTree>
+    <p:extLst>
+      <p:ext uri="{BB962C8B-B14F-4D97-AF65-F5344CB8AC3E}">
+        <p14:creationId xmlns:p14="http://schemas.microsoft.com/office/powerpoint/2010/main" val="2445237643"/>
+      </p:ext>
+    </p:extLst>
+  </p:cSld>
+  <p:clrMapOvr>
+    <a:masterClrMapping/>
+  </p:clrMapOvr>
+</p:notes>
+</file>
+
+<file path=ppt/notesSlides/notesSlide62.xml><?xml version="1.0" encoding="utf-8"?>
+<p:notes xmlns:a="http://schemas.openxmlformats.org/drawingml/2006/main" xmlns:r="http://schemas.openxmlformats.org/officeDocument/2006/relationships" xmlns:p="http://schemas.openxmlformats.org/presentationml/2006/main">
+  <p:cSld>
+    <p:spTree>
+      <p:nvGrpSpPr>
+        <p:cNvPr id="1" name=""/>
+        <p:cNvGrpSpPr/>
+        <p:nvPr/>
+      </p:nvGrpSpPr>
+      <p:grpSpPr>
+        <a:xfrm>
+          <a:off x="0" y="0"/>
+          <a:ext cx="0" cy="0"/>
+          <a:chOff x="0" y="0"/>
+          <a:chExt cx="0" cy="0"/>
+        </a:xfrm>
+      </p:grpSpPr>
+      <p:sp>
+        <p:nvSpPr>
+          <p:cNvPr id="2" name="Slide Image Placeholder 1"/>
+          <p:cNvSpPr>
+            <a:spLocks noGrp="1" noRot="1" noChangeAspect="1"/>
+          </p:cNvSpPr>
+          <p:nvPr>
+            <p:ph type="sldImg"/>
+          </p:nvPr>
+        </p:nvSpPr>
+        <p:spPr/>
+      </p:sp>
+      <p:sp>
+        <p:nvSpPr>
+          <p:cNvPr id="3" name="Notes Placeholder 2"/>
+          <p:cNvSpPr>
+            <a:spLocks noGrp="1"/>
+          </p:cNvSpPr>
+          <p:nvPr>
+            <p:ph type="body" idx="1"/>
+          </p:nvPr>
+        </p:nvSpPr>
+        <p:spPr/>
+        <p:txBody>
+          <a:bodyPr/>
+          <a:lstStyle/>
+          <a:p>
+            <a:endParaRPr lang="en-US" dirty="0"/>
+          </a:p>
+        </p:txBody>
+      </p:sp>
+      <p:sp>
+        <p:nvSpPr>
+          <p:cNvPr id="4" name="Slide Number Placeholder 3"/>
+          <p:cNvSpPr>
+            <a:spLocks noGrp="1"/>
+          </p:cNvSpPr>
+          <p:nvPr>
+            <p:ph type="sldNum" sz="quarter" idx="5"/>
+          </p:nvPr>
+        </p:nvSpPr>
+        <p:spPr/>
+        <p:txBody>
+          <a:bodyPr/>
+          <a:lstStyle/>
+          <a:p>
+            <a:fld id="{3E4A7109-D3E0-47BA-A045-9A99591D35D8}" type="slidenum">
+              <a:rPr lang="en-US" smtClean="0"/>
+              <a:t>63</a:t>
+            </a:fld>
+            <a:endParaRPr lang="en-US"/>
+          </a:p>
+        </p:txBody>
+      </p:sp>
+    </p:spTree>
+    <p:extLst>
+      <p:ext uri="{BB962C8B-B14F-4D97-AF65-F5344CB8AC3E}">
+        <p14:creationId xmlns:p14="http://schemas.microsoft.com/office/powerpoint/2010/main" val="1991853003"/>
+      </p:ext>
+    </p:extLst>
+  </p:cSld>
+  <p:clrMapOvr>
+    <a:masterClrMapping/>
+  </p:clrMapOvr>
+</p:notes>
+</file>
+
+<file path=ppt/notesSlides/notesSlide63.xml><?xml version="1.0" encoding="utf-8"?>
+<p:notes xmlns:a="http://schemas.openxmlformats.org/drawingml/2006/main" xmlns:r="http://schemas.openxmlformats.org/officeDocument/2006/relationships" xmlns:p="http://schemas.openxmlformats.org/presentationml/2006/main">
+  <p:cSld>
+    <p:spTree>
+      <p:nvGrpSpPr>
+        <p:cNvPr id="1" name=""/>
+        <p:cNvGrpSpPr/>
+        <p:nvPr/>
+      </p:nvGrpSpPr>
+      <p:grpSpPr>
+        <a:xfrm>
+          <a:off x="0" y="0"/>
+          <a:ext cx="0" cy="0"/>
+          <a:chOff x="0" y="0"/>
+          <a:chExt cx="0" cy="0"/>
+        </a:xfrm>
+      </p:grpSpPr>
+      <p:sp>
+        <p:nvSpPr>
+          <p:cNvPr id="2" name="Slide Image Placeholder 1"/>
+          <p:cNvSpPr>
+            <a:spLocks noGrp="1" noRot="1" noChangeAspect="1"/>
+          </p:cNvSpPr>
+          <p:nvPr>
+            <p:ph type="sldImg"/>
+          </p:nvPr>
+        </p:nvSpPr>
+        <p:spPr/>
+      </p:sp>
+      <p:sp>
+        <p:nvSpPr>
+          <p:cNvPr id="3" name="Notes Placeholder 2"/>
+          <p:cNvSpPr>
+            <a:spLocks noGrp="1"/>
+          </p:cNvSpPr>
+          <p:nvPr>
+            <p:ph type="body" idx="1"/>
+          </p:nvPr>
+        </p:nvSpPr>
+        <p:spPr/>
+        <p:txBody>
+          <a:bodyPr/>
+          <a:lstStyle/>
+          <a:p>
+            <a:endParaRPr lang="en-US" dirty="0"/>
+          </a:p>
+        </p:txBody>
+      </p:sp>
+      <p:sp>
+        <p:nvSpPr>
+          <p:cNvPr id="4" name="Slide Number Placeholder 3"/>
+          <p:cNvSpPr>
+            <a:spLocks noGrp="1"/>
+          </p:cNvSpPr>
+          <p:nvPr>
+            <p:ph type="sldNum" sz="quarter" idx="5"/>
+          </p:nvPr>
+        </p:nvSpPr>
+        <p:spPr/>
+        <p:txBody>
+          <a:bodyPr/>
+          <a:lstStyle/>
+          <a:p>
+            <a:fld id="{3E4A7109-D3E0-47BA-A045-9A99591D35D8}" type="slidenum">
+              <a:rPr lang="en-US" smtClean="0"/>
+              <a:t>64</a:t>
+            </a:fld>
+            <a:endParaRPr lang="en-US"/>
+          </a:p>
+        </p:txBody>
+      </p:sp>
+    </p:spTree>
+    <p:extLst>
+      <p:ext uri="{BB962C8B-B14F-4D97-AF65-F5344CB8AC3E}">
+        <p14:creationId xmlns:p14="http://schemas.microsoft.com/office/powerpoint/2010/main" val="3698642653"/>
+      </p:ext>
+    </p:extLst>
+  </p:cSld>
+  <p:clrMapOvr>
+    <a:masterClrMapping/>
+  </p:clrMapOvr>
+</p:notes>
+</file>
+
+<file path=ppt/notesSlides/notesSlide64.xml><?xml version="1.0" encoding="utf-8"?>
+<p:notes xmlns:a="http://schemas.openxmlformats.org/drawingml/2006/main" xmlns:r="http://schemas.openxmlformats.org/officeDocument/2006/relationships" xmlns:p="http://schemas.openxmlformats.org/presentationml/2006/main">
+  <p:cSld>
+    <p:spTree>
+      <p:nvGrpSpPr>
+        <p:cNvPr id="1" name=""/>
+        <p:cNvGrpSpPr/>
+        <p:nvPr/>
+      </p:nvGrpSpPr>
+      <p:grpSpPr>
+        <a:xfrm>
+          <a:off x="0" y="0"/>
+          <a:ext cx="0" cy="0"/>
+          <a:chOff x="0" y="0"/>
+          <a:chExt cx="0" cy="0"/>
+        </a:xfrm>
+      </p:grpSpPr>
+      <p:sp>
+        <p:nvSpPr>
+          <p:cNvPr id="2" name="Slide Image Placeholder 1"/>
+          <p:cNvSpPr>
+            <a:spLocks noGrp="1" noRot="1" noChangeAspect="1"/>
+          </p:cNvSpPr>
+          <p:nvPr>
+            <p:ph type="sldImg"/>
+          </p:nvPr>
+        </p:nvSpPr>
+        <p:spPr/>
+      </p:sp>
+      <p:sp>
+        <p:nvSpPr>
+          <p:cNvPr id="3" name="Notes Placeholder 2"/>
+          <p:cNvSpPr>
+            <a:spLocks noGrp="1"/>
+          </p:cNvSpPr>
+          <p:nvPr>
+            <p:ph type="body" idx="1"/>
+          </p:nvPr>
+        </p:nvSpPr>
+        <p:spPr/>
+        <p:txBody>
+          <a:bodyPr/>
+          <a:lstStyle/>
+          <a:p>
+            <a:endParaRPr lang="en-US" dirty="0"/>
+          </a:p>
+        </p:txBody>
+      </p:sp>
+      <p:sp>
+        <p:nvSpPr>
+          <p:cNvPr id="4" name="Slide Number Placeholder 3"/>
+          <p:cNvSpPr>
+            <a:spLocks noGrp="1"/>
+          </p:cNvSpPr>
+          <p:nvPr>
+            <p:ph type="sldNum" sz="quarter" idx="5"/>
+          </p:nvPr>
+        </p:nvSpPr>
+        <p:spPr/>
+        <p:txBody>
+          <a:bodyPr/>
+          <a:lstStyle/>
+          <a:p>
+            <a:fld id="{3E4A7109-D3E0-47BA-A045-9A99591D35D8}" type="slidenum">
+              <a:rPr lang="en-US" smtClean="0"/>
+              <a:t>65</a:t>
+            </a:fld>
+            <a:endParaRPr lang="en-US"/>
+          </a:p>
+        </p:txBody>
+      </p:sp>
+    </p:spTree>
+    <p:extLst>
+      <p:ext uri="{BB962C8B-B14F-4D97-AF65-F5344CB8AC3E}">
+        <p14:creationId xmlns:p14="http://schemas.microsoft.com/office/powerpoint/2010/main" val="2390143825"/>
+      </p:ext>
+    </p:extLst>
+  </p:cSld>
+  <p:clrMapOvr>
+    <a:masterClrMapping/>
+  </p:clrMapOvr>
+</p:notes>
+</file>
+
+<file path=ppt/notesSlides/notesSlide65.xml><?xml version="1.0" encoding="utf-8"?>
+<p:notes xmlns:a="http://schemas.openxmlformats.org/drawingml/2006/main" xmlns:r="http://schemas.openxmlformats.org/officeDocument/2006/relationships" xmlns:p="http://schemas.openxmlformats.org/presentationml/2006/main">
+  <p:cSld>
+    <p:spTree>
+      <p:nvGrpSpPr>
+        <p:cNvPr id="1" name=""/>
+        <p:cNvGrpSpPr/>
+        <p:nvPr/>
+      </p:nvGrpSpPr>
+      <p:grpSpPr>
+        <a:xfrm>
+          <a:off x="0" y="0"/>
+          <a:ext cx="0" cy="0"/>
+          <a:chOff x="0" y="0"/>
+          <a:chExt cx="0" cy="0"/>
+        </a:xfrm>
+      </p:grpSpPr>
+      <p:sp>
+        <p:nvSpPr>
+          <p:cNvPr id="2" name="Slide Image Placeholder 1"/>
+          <p:cNvSpPr>
+            <a:spLocks noGrp="1" noRot="1" noChangeAspect="1"/>
+          </p:cNvSpPr>
+          <p:nvPr>
+            <p:ph type="sldImg"/>
+          </p:nvPr>
+        </p:nvSpPr>
+        <p:spPr/>
+      </p:sp>
+      <p:sp>
+        <p:nvSpPr>
+          <p:cNvPr id="3" name="Notes Placeholder 2"/>
+          <p:cNvSpPr>
+            <a:spLocks noGrp="1"/>
+          </p:cNvSpPr>
+          <p:nvPr>
+            <p:ph type="body" idx="1"/>
+          </p:nvPr>
+        </p:nvSpPr>
+        <p:spPr/>
+        <p:txBody>
+          <a:bodyPr/>
+          <a:lstStyle/>
+          <a:p>
+            <a:endParaRPr lang="en-US" dirty="0"/>
+          </a:p>
+        </p:txBody>
+      </p:sp>
+      <p:sp>
+        <p:nvSpPr>
+          <p:cNvPr id="4" name="Slide Number Placeholder 3"/>
+          <p:cNvSpPr>
+            <a:spLocks noGrp="1"/>
+          </p:cNvSpPr>
+          <p:nvPr>
+            <p:ph type="sldNum" sz="quarter" idx="5"/>
+          </p:nvPr>
+        </p:nvSpPr>
+        <p:spPr/>
+        <p:txBody>
+          <a:bodyPr/>
+          <a:lstStyle/>
+          <a:p>
+            <a:fld id="{3E4A7109-D3E0-47BA-A045-9A99591D35D8}" type="slidenum">
+              <a:rPr lang="en-US" smtClean="0"/>
+              <a:t>66</a:t>
+            </a:fld>
+            <a:endParaRPr lang="en-US"/>
+          </a:p>
+        </p:txBody>
+      </p:sp>
+    </p:spTree>
+    <p:extLst>
+      <p:ext uri="{BB962C8B-B14F-4D97-AF65-F5344CB8AC3E}">
+        <p14:creationId xmlns:p14="http://schemas.microsoft.com/office/powerpoint/2010/main" val="3703510525"/>
+      </p:ext>
+    </p:extLst>
+  </p:cSld>
+  <p:clrMapOvr>
+    <a:masterClrMapping/>
+  </p:clrMapOvr>
+</p:notes>
+</file>
+
+<file path=ppt/notesSlides/notesSlide66.xml><?xml version="1.0" encoding="utf-8"?>
+<p:notes xmlns:a="http://schemas.openxmlformats.org/drawingml/2006/main" xmlns:r="http://schemas.openxmlformats.org/officeDocument/2006/relationships" xmlns:p="http://schemas.openxmlformats.org/presentationml/2006/main">
+  <p:cSld>
+    <p:spTree>
+      <p:nvGrpSpPr>
+        <p:cNvPr id="1" name=""/>
+        <p:cNvGrpSpPr/>
+        <p:nvPr/>
+      </p:nvGrpSpPr>
+      <p:grpSpPr>
+        <a:xfrm>
+          <a:off x="0" y="0"/>
+          <a:ext cx="0" cy="0"/>
+          <a:chOff x="0" y="0"/>
+          <a:chExt cx="0" cy="0"/>
+        </a:xfrm>
+      </p:grpSpPr>
+      <p:sp>
+        <p:nvSpPr>
+          <p:cNvPr id="2" name="Slide Image Placeholder 1"/>
+          <p:cNvSpPr>
+            <a:spLocks noGrp="1" noRot="1" noChangeAspect="1"/>
+          </p:cNvSpPr>
+          <p:nvPr>
+            <p:ph type="sldImg"/>
+          </p:nvPr>
+        </p:nvSpPr>
+        <p:spPr/>
+      </p:sp>
+      <p:sp>
+        <p:nvSpPr>
+          <p:cNvPr id="3" name="Notes Placeholder 2"/>
+          <p:cNvSpPr>
+            <a:spLocks noGrp="1"/>
+          </p:cNvSpPr>
+          <p:nvPr>
+            <p:ph type="body" idx="1"/>
+          </p:nvPr>
+        </p:nvSpPr>
+        <p:spPr/>
+        <p:txBody>
+          <a:bodyPr/>
+          <a:lstStyle/>
+          <a:p>
+            <a:endParaRPr lang="en-US" dirty="0"/>
+          </a:p>
+        </p:txBody>
+      </p:sp>
+      <p:sp>
+        <p:nvSpPr>
+          <p:cNvPr id="4" name="Slide Number Placeholder 3"/>
+          <p:cNvSpPr>
+            <a:spLocks noGrp="1"/>
+          </p:cNvSpPr>
+          <p:nvPr>
+            <p:ph type="sldNum" sz="quarter" idx="5"/>
+          </p:nvPr>
+        </p:nvSpPr>
+        <p:spPr/>
+        <p:txBody>
+          <a:bodyPr/>
+          <a:lstStyle/>
+          <a:p>
+            <a:fld id="{3E4A7109-D3E0-47BA-A045-9A99591D35D8}" type="slidenum">
+              <a:rPr lang="en-US" smtClean="0"/>
+              <a:t>67</a:t>
+            </a:fld>
+            <a:endParaRPr lang="en-US"/>
+          </a:p>
+        </p:txBody>
+      </p:sp>
+    </p:spTree>
+    <p:extLst>
+      <p:ext uri="{BB962C8B-B14F-4D97-AF65-F5344CB8AC3E}">
+        <p14:creationId xmlns:p14="http://schemas.microsoft.com/office/powerpoint/2010/main" val="2795005600"/>
+      </p:ext>
+    </p:extLst>
+  </p:cSld>
+  <p:clrMapOvr>
+    <a:masterClrMapping/>
+  </p:clrMapOvr>
+</p:notes>
+</file>
+
 <file path=ppt/notesSlides/notesSlide7.xml><?xml version="1.0" encoding="utf-8"?>
 <p:notes xmlns:a="http://schemas.openxmlformats.org/drawingml/2006/main" xmlns:r="http://schemas.openxmlformats.org/officeDocument/2006/relationships" xmlns:p="http://schemas.openxmlformats.org/presentationml/2006/main">
   <p:cSld>
@@ -15282,7 +15792,7 @@
           <a:p>
             <a:fld id="{B8959F3C-9879-4806-ADC7-BA321CD3F53D}" type="datetimeFigureOut">
               <a:rPr lang="en-US" smtClean="0"/>
-              <a:t>12-Aug-24</a:t>
+              <a:t>15-Aug-24</a:t>
             </a:fld>
             <a:endParaRPr lang="en-US"/>
           </a:p>
@@ -15480,7 +15990,7 @@
           <a:p>
             <a:fld id="{B8959F3C-9879-4806-ADC7-BA321CD3F53D}" type="datetimeFigureOut">
               <a:rPr lang="en-US" smtClean="0"/>
-              <a:t>12-Aug-24</a:t>
+              <a:t>15-Aug-24</a:t>
             </a:fld>
             <a:endParaRPr lang="en-US"/>
           </a:p>
@@ -15688,7 +16198,7 @@
           <a:p>
             <a:fld id="{B8959F3C-9879-4806-ADC7-BA321CD3F53D}" type="datetimeFigureOut">
               <a:rPr lang="en-US" smtClean="0"/>
-              <a:t>12-Aug-24</a:t>
+              <a:t>15-Aug-24</a:t>
             </a:fld>
             <a:endParaRPr lang="en-US"/>
           </a:p>
@@ -15886,7 +16396,7 @@
           <a:p>
             <a:fld id="{B8959F3C-9879-4806-ADC7-BA321CD3F53D}" type="datetimeFigureOut">
               <a:rPr lang="en-US" smtClean="0"/>
-              <a:t>12-Aug-24</a:t>
+              <a:t>15-Aug-24</a:t>
             </a:fld>
             <a:endParaRPr lang="en-US"/>
           </a:p>
@@ -16161,7 +16671,7 @@
           <a:p>
             <a:fld id="{B8959F3C-9879-4806-ADC7-BA321CD3F53D}" type="datetimeFigureOut">
               <a:rPr lang="en-US" smtClean="0"/>
-              <a:t>12-Aug-24</a:t>
+              <a:t>15-Aug-24</a:t>
             </a:fld>
             <a:endParaRPr lang="en-US"/>
           </a:p>
@@ -16426,7 +16936,7 @@
           <a:p>
             <a:fld id="{B8959F3C-9879-4806-ADC7-BA321CD3F53D}" type="datetimeFigureOut">
               <a:rPr lang="en-US" smtClean="0"/>
-              <a:t>12-Aug-24</a:t>
+              <a:t>15-Aug-24</a:t>
             </a:fld>
             <a:endParaRPr lang="en-US"/>
           </a:p>
@@ -16838,7 +17348,7 @@
           <a:p>
             <a:fld id="{B8959F3C-9879-4806-ADC7-BA321CD3F53D}" type="datetimeFigureOut">
               <a:rPr lang="en-US" smtClean="0"/>
-              <a:t>12-Aug-24</a:t>
+              <a:t>15-Aug-24</a:t>
             </a:fld>
             <a:endParaRPr lang="en-US"/>
           </a:p>
@@ -16979,7 +17489,7 @@
           <a:p>
             <a:fld id="{B8959F3C-9879-4806-ADC7-BA321CD3F53D}" type="datetimeFigureOut">
               <a:rPr lang="en-US" smtClean="0"/>
-              <a:t>12-Aug-24</a:t>
+              <a:t>15-Aug-24</a:t>
             </a:fld>
             <a:endParaRPr lang="en-US"/>
           </a:p>
@@ -17092,7 +17602,7 @@
           <a:p>
             <a:fld id="{B8959F3C-9879-4806-ADC7-BA321CD3F53D}" type="datetimeFigureOut">
               <a:rPr lang="en-US" smtClean="0"/>
-              <a:t>12-Aug-24</a:t>
+              <a:t>15-Aug-24</a:t>
             </a:fld>
             <a:endParaRPr lang="en-US"/>
           </a:p>
@@ -17403,7 +17913,7 @@
           <a:p>
             <a:fld id="{B8959F3C-9879-4806-ADC7-BA321CD3F53D}" type="datetimeFigureOut">
               <a:rPr lang="en-US" smtClean="0"/>
-              <a:t>12-Aug-24</a:t>
+              <a:t>15-Aug-24</a:t>
             </a:fld>
             <a:endParaRPr lang="en-US"/>
           </a:p>
@@ -17691,7 +18201,7 @@
           <a:p>
             <a:fld id="{B8959F3C-9879-4806-ADC7-BA321CD3F53D}" type="datetimeFigureOut">
               <a:rPr lang="en-US" smtClean="0"/>
-              <a:t>12-Aug-24</a:t>
+              <a:t>15-Aug-24</a:t>
             </a:fld>
             <a:endParaRPr lang="en-US"/>
           </a:p>
@@ -17932,7 +18442,7 @@
           <a:p>
             <a:fld id="{B8959F3C-9879-4806-ADC7-BA321CD3F53D}" type="datetimeFigureOut">
               <a:rPr lang="en-US" smtClean="0"/>
-              <a:t>12-Aug-24</a:t>
+              <a:t>15-Aug-24</a:t>
             </a:fld>
             <a:endParaRPr lang="en-US"/>
           </a:p>
@@ -38082,6 +38592,834 @@
     <p:extLst>
       <p:ext uri="{BB962C8B-B14F-4D97-AF65-F5344CB8AC3E}">
         <p14:creationId xmlns:p14="http://schemas.microsoft.com/office/powerpoint/2010/main" val="954865611"/>
+      </p:ext>
+    </p:extLst>
+  </p:cSld>
+  <p:clrMapOvr>
+    <a:masterClrMapping/>
+  </p:clrMapOvr>
+</p:sld>
+</file>
+
+<file path=ppt/slides/slide62.xml><?xml version="1.0" encoding="utf-8"?>
+<p:sld xmlns:a="http://schemas.openxmlformats.org/drawingml/2006/main" xmlns:r="http://schemas.openxmlformats.org/officeDocument/2006/relationships" xmlns:p="http://schemas.openxmlformats.org/presentationml/2006/main">
+  <p:cSld>
+    <p:spTree>
+      <p:nvGrpSpPr>
+        <p:cNvPr id="1" name=""/>
+        <p:cNvGrpSpPr/>
+        <p:nvPr/>
+      </p:nvGrpSpPr>
+      <p:grpSpPr>
+        <a:xfrm>
+          <a:off x="0" y="0"/>
+          <a:ext cx="0" cy="0"/>
+          <a:chOff x="0" y="0"/>
+          <a:chExt cx="0" cy="0"/>
+        </a:xfrm>
+      </p:grpSpPr>
+      <p:sp>
+        <p:nvSpPr>
+          <p:cNvPr id="2" name="Title 1">
+            <a:extLst>
+              <a:ext uri="{FF2B5EF4-FFF2-40B4-BE49-F238E27FC236}">
+                <a16:creationId xmlns:a16="http://schemas.microsoft.com/office/drawing/2014/main" id="{1F8717B5-F992-3362-0E17-84D889214116}"/>
+              </a:ext>
+            </a:extLst>
+          </p:cNvPr>
+          <p:cNvSpPr>
+            <a:spLocks noGrp="1"/>
+          </p:cNvSpPr>
+          <p:nvPr>
+            <p:ph type="title"/>
+          </p:nvPr>
+        </p:nvSpPr>
+        <p:spPr/>
+        <p:txBody>
+          <a:bodyPr>
+            <a:normAutofit/>
+          </a:bodyPr>
+          <a:lstStyle/>
+          <a:p>
+            <a:r>
+              <a:rPr lang="en-US" sz="2400" b="1" dirty="0"/>
+              <a:t>System-User Prompt Design</a:t>
+            </a:r>
+          </a:p>
+        </p:txBody>
+      </p:sp>
+      <p:sp>
+        <p:nvSpPr>
+          <p:cNvPr id="3" name="Content Placeholder 2">
+            <a:extLst>
+              <a:ext uri="{FF2B5EF4-FFF2-40B4-BE49-F238E27FC236}">
+                <a16:creationId xmlns:a16="http://schemas.microsoft.com/office/drawing/2014/main" id="{6A1CF6AE-4BFF-FA1F-6998-093945033E5D}"/>
+              </a:ext>
+            </a:extLst>
+          </p:cNvPr>
+          <p:cNvSpPr>
+            <a:spLocks noGrp="1"/>
+          </p:cNvSpPr>
+          <p:nvPr>
+            <p:ph idx="1"/>
+          </p:nvPr>
+        </p:nvSpPr>
+        <p:spPr/>
+        <p:txBody>
+          <a:bodyPr>
+            <a:normAutofit/>
+          </a:bodyPr>
+          <a:lstStyle/>
+          <a:p>
+            <a:r>
+              <a:rPr lang="en-US" sz="1800" dirty="0"/>
+              <a:t>One way to increase the performance of the model is to use System-User Prompt structure.</a:t>
+            </a:r>
+          </a:p>
+          <a:p>
+            <a:r>
+              <a:rPr lang="en-US" sz="1800" dirty="0"/>
+              <a:t>In this way, the system prompt is constructed around defining the task and what model should generate.</a:t>
+            </a:r>
+          </a:p>
+          <a:p>
+            <a:r>
+              <a:rPr lang="en-US" sz="1800" dirty="0"/>
+              <a:t>The user prompt is considered as the prompt given by the user.</a:t>
+            </a:r>
+          </a:p>
+          <a:p>
+            <a:r>
+              <a:rPr lang="en-US" sz="1800" dirty="0"/>
+              <a:t>The system prompt is mostly unchanged throughout the iterations and user prompt is always dynamic.</a:t>
+            </a:r>
+          </a:p>
+        </p:txBody>
+      </p:sp>
+    </p:spTree>
+    <p:extLst>
+      <p:ext uri="{BB962C8B-B14F-4D97-AF65-F5344CB8AC3E}">
+        <p14:creationId xmlns:p14="http://schemas.microsoft.com/office/powerpoint/2010/main" val="1815777174"/>
+      </p:ext>
+    </p:extLst>
+  </p:cSld>
+  <p:clrMapOvr>
+    <a:masterClrMapping/>
+  </p:clrMapOvr>
+</p:sld>
+</file>
+
+<file path=ppt/slides/slide63.xml><?xml version="1.0" encoding="utf-8"?>
+<p:sld xmlns:a="http://schemas.openxmlformats.org/drawingml/2006/main" xmlns:r="http://schemas.openxmlformats.org/officeDocument/2006/relationships" xmlns:p="http://schemas.openxmlformats.org/presentationml/2006/main">
+  <p:cSld>
+    <p:spTree>
+      <p:nvGrpSpPr>
+        <p:cNvPr id="1" name=""/>
+        <p:cNvGrpSpPr/>
+        <p:nvPr/>
+      </p:nvGrpSpPr>
+      <p:grpSpPr>
+        <a:xfrm>
+          <a:off x="0" y="0"/>
+          <a:ext cx="0" cy="0"/>
+          <a:chOff x="0" y="0"/>
+          <a:chExt cx="0" cy="0"/>
+        </a:xfrm>
+      </p:grpSpPr>
+      <p:sp>
+        <p:nvSpPr>
+          <p:cNvPr id="2" name="Title 1">
+            <a:extLst>
+              <a:ext uri="{FF2B5EF4-FFF2-40B4-BE49-F238E27FC236}">
+                <a16:creationId xmlns:a16="http://schemas.microsoft.com/office/drawing/2014/main" id="{1F8717B5-F992-3362-0E17-84D889214116}"/>
+              </a:ext>
+            </a:extLst>
+          </p:cNvPr>
+          <p:cNvSpPr>
+            <a:spLocks noGrp="1"/>
+          </p:cNvSpPr>
+          <p:nvPr>
+            <p:ph type="title"/>
+          </p:nvPr>
+        </p:nvSpPr>
+        <p:spPr/>
+        <p:txBody>
+          <a:bodyPr>
+            <a:normAutofit/>
+          </a:bodyPr>
+          <a:lstStyle/>
+          <a:p>
+            <a:r>
+              <a:rPr lang="en-US" sz="2400" b="1" dirty="0"/>
+              <a:t>System-User Prompt Design</a:t>
+            </a:r>
+          </a:p>
+        </p:txBody>
+      </p:sp>
+      <p:sp>
+        <p:nvSpPr>
+          <p:cNvPr id="3" name="Content Placeholder 2">
+            <a:extLst>
+              <a:ext uri="{FF2B5EF4-FFF2-40B4-BE49-F238E27FC236}">
+                <a16:creationId xmlns:a16="http://schemas.microsoft.com/office/drawing/2014/main" id="{6A1CF6AE-4BFF-FA1F-6998-093945033E5D}"/>
+              </a:ext>
+            </a:extLst>
+          </p:cNvPr>
+          <p:cNvSpPr>
+            <a:spLocks noGrp="1"/>
+          </p:cNvSpPr>
+          <p:nvPr>
+            <p:ph idx="1"/>
+          </p:nvPr>
+        </p:nvSpPr>
+        <p:spPr/>
+        <p:txBody>
+          <a:bodyPr>
+            <a:normAutofit/>
+          </a:bodyPr>
+          <a:lstStyle/>
+          <a:p>
+            <a:r>
+              <a:rPr lang="en-US" sz="1800" dirty="0"/>
+              <a:t>The input prompt which is only in Persian language:</a:t>
+            </a:r>
+          </a:p>
+          <a:p>
+            <a:endParaRPr lang="en-US" sz="1800" dirty="0"/>
+          </a:p>
+          <a:p>
+            <a:endParaRPr lang="en-US" sz="1800" dirty="0"/>
+          </a:p>
+          <a:p>
+            <a:endParaRPr lang="en-US" sz="1800" dirty="0"/>
+          </a:p>
+          <a:p>
+            <a:endParaRPr lang="en-US" sz="1800" dirty="0"/>
+          </a:p>
+          <a:p>
+            <a:endParaRPr lang="en-US" sz="1800" dirty="0"/>
+          </a:p>
+          <a:p>
+            <a:endParaRPr lang="en-US" sz="1800" dirty="0"/>
+          </a:p>
+          <a:p>
+            <a:endParaRPr lang="en-US" sz="1800" dirty="0"/>
+          </a:p>
+          <a:p>
+            <a:endParaRPr lang="en-US" sz="1800" dirty="0"/>
+          </a:p>
+          <a:p>
+            <a:r>
+              <a:rPr lang="en-US" sz="1800" dirty="0"/>
+              <a:t>Without the use of any system-user prompt instruction.</a:t>
+            </a:r>
+          </a:p>
+        </p:txBody>
+      </p:sp>
+      <p:pic>
+        <p:nvPicPr>
+          <p:cNvPr id="5" name="Picture 4">
+            <a:extLst>
+              <a:ext uri="{FF2B5EF4-FFF2-40B4-BE49-F238E27FC236}">
+                <a16:creationId xmlns:a16="http://schemas.microsoft.com/office/drawing/2014/main" id="{47FA13F9-CC3A-08A8-9461-44001C838562}"/>
+              </a:ext>
+            </a:extLst>
+          </p:cNvPr>
+          <p:cNvPicPr>
+            <a:picLocks noChangeAspect="1"/>
+          </p:cNvPicPr>
+          <p:nvPr/>
+        </p:nvPicPr>
+        <p:blipFill>
+          <a:blip r:embed="rId3"/>
+          <a:stretch>
+            <a:fillRect/>
+          </a:stretch>
+        </p:blipFill>
+        <p:spPr>
+          <a:xfrm>
+            <a:off x="1574144" y="2353475"/>
+            <a:ext cx="9043711" cy="2249990"/>
+          </a:xfrm>
+          <a:prstGeom prst="rect">
+            <a:avLst/>
+          </a:prstGeom>
+        </p:spPr>
+      </p:pic>
+    </p:spTree>
+    <p:extLst>
+      <p:ext uri="{BB962C8B-B14F-4D97-AF65-F5344CB8AC3E}">
+        <p14:creationId xmlns:p14="http://schemas.microsoft.com/office/powerpoint/2010/main" val="1249877832"/>
+      </p:ext>
+    </p:extLst>
+  </p:cSld>
+  <p:clrMapOvr>
+    <a:masterClrMapping/>
+  </p:clrMapOvr>
+</p:sld>
+</file>
+
+<file path=ppt/slides/slide64.xml><?xml version="1.0" encoding="utf-8"?>
+<p:sld xmlns:a="http://schemas.openxmlformats.org/drawingml/2006/main" xmlns:r="http://schemas.openxmlformats.org/officeDocument/2006/relationships" xmlns:p="http://schemas.openxmlformats.org/presentationml/2006/main">
+  <p:cSld>
+    <p:spTree>
+      <p:nvGrpSpPr>
+        <p:cNvPr id="1" name=""/>
+        <p:cNvGrpSpPr/>
+        <p:nvPr/>
+      </p:nvGrpSpPr>
+      <p:grpSpPr>
+        <a:xfrm>
+          <a:off x="0" y="0"/>
+          <a:ext cx="0" cy="0"/>
+          <a:chOff x="0" y="0"/>
+          <a:chExt cx="0" cy="0"/>
+        </a:xfrm>
+      </p:grpSpPr>
+      <p:sp>
+        <p:nvSpPr>
+          <p:cNvPr id="2" name="Title 1">
+            <a:extLst>
+              <a:ext uri="{FF2B5EF4-FFF2-40B4-BE49-F238E27FC236}">
+                <a16:creationId xmlns:a16="http://schemas.microsoft.com/office/drawing/2014/main" id="{1F8717B5-F992-3362-0E17-84D889214116}"/>
+              </a:ext>
+            </a:extLst>
+          </p:cNvPr>
+          <p:cNvSpPr>
+            <a:spLocks noGrp="1"/>
+          </p:cNvSpPr>
+          <p:nvPr>
+            <p:ph type="title"/>
+          </p:nvPr>
+        </p:nvSpPr>
+        <p:spPr/>
+        <p:txBody>
+          <a:bodyPr>
+            <a:normAutofit/>
+          </a:bodyPr>
+          <a:lstStyle/>
+          <a:p>
+            <a:r>
+              <a:rPr lang="en-US" sz="2400" b="1" dirty="0"/>
+              <a:t>System-User Prompt Design</a:t>
+            </a:r>
+          </a:p>
+        </p:txBody>
+      </p:sp>
+      <p:sp>
+        <p:nvSpPr>
+          <p:cNvPr id="3" name="Content Placeholder 2">
+            <a:extLst>
+              <a:ext uri="{FF2B5EF4-FFF2-40B4-BE49-F238E27FC236}">
+                <a16:creationId xmlns:a16="http://schemas.microsoft.com/office/drawing/2014/main" id="{6A1CF6AE-4BFF-FA1F-6998-093945033E5D}"/>
+              </a:ext>
+            </a:extLst>
+          </p:cNvPr>
+          <p:cNvSpPr>
+            <a:spLocks noGrp="1"/>
+          </p:cNvSpPr>
+          <p:nvPr>
+            <p:ph idx="1"/>
+          </p:nvPr>
+        </p:nvSpPr>
+        <p:spPr/>
+        <p:txBody>
+          <a:bodyPr>
+            <a:normAutofit lnSpcReduction="10000"/>
+          </a:bodyPr>
+          <a:lstStyle/>
+          <a:p>
+            <a:r>
+              <a:rPr lang="en-US" sz="1800" dirty="0"/>
+              <a:t>And this is the result form Gemma2 9b it:</a:t>
+            </a:r>
+          </a:p>
+          <a:p>
+            <a:endParaRPr lang="en-US" sz="1800" dirty="0"/>
+          </a:p>
+          <a:p>
+            <a:endParaRPr lang="en-US" sz="1800" dirty="0"/>
+          </a:p>
+          <a:p>
+            <a:endParaRPr lang="en-US" sz="1800" dirty="0"/>
+          </a:p>
+          <a:p>
+            <a:endParaRPr lang="en-US" sz="1800" dirty="0"/>
+          </a:p>
+          <a:p>
+            <a:endParaRPr lang="en-US" sz="1800" dirty="0"/>
+          </a:p>
+          <a:p>
+            <a:endParaRPr lang="en-US" sz="1800" dirty="0"/>
+          </a:p>
+          <a:p>
+            <a:endParaRPr lang="en-US" sz="1800" dirty="0"/>
+          </a:p>
+          <a:p>
+            <a:endParaRPr lang="en-US" sz="1800" dirty="0"/>
+          </a:p>
+          <a:p>
+            <a:endParaRPr lang="en-US" sz="1800" dirty="0"/>
+          </a:p>
+          <a:p>
+            <a:endParaRPr lang="en-US" sz="1800" dirty="0"/>
+          </a:p>
+          <a:p>
+            <a:r>
+              <a:rPr lang="en-US" sz="1800" dirty="0"/>
+              <a:t>Which is quite acceptable</a:t>
+            </a:r>
+          </a:p>
+        </p:txBody>
+      </p:sp>
+      <p:pic>
+        <p:nvPicPr>
+          <p:cNvPr id="6" name="Picture 5">
+            <a:extLst>
+              <a:ext uri="{FF2B5EF4-FFF2-40B4-BE49-F238E27FC236}">
+                <a16:creationId xmlns:a16="http://schemas.microsoft.com/office/drawing/2014/main" id="{E834A0BD-B8F5-7529-CF9D-F88B163F543F}"/>
+              </a:ext>
+            </a:extLst>
+          </p:cNvPr>
+          <p:cNvPicPr>
+            <a:picLocks noChangeAspect="1"/>
+          </p:cNvPicPr>
+          <p:nvPr/>
+        </p:nvPicPr>
+        <p:blipFill>
+          <a:blip r:embed="rId3"/>
+          <a:stretch>
+            <a:fillRect/>
+          </a:stretch>
+        </p:blipFill>
+        <p:spPr>
+          <a:xfrm>
+            <a:off x="934064" y="2178021"/>
+            <a:ext cx="10323871" cy="3357229"/>
+          </a:xfrm>
+          <a:prstGeom prst="rect">
+            <a:avLst/>
+          </a:prstGeom>
+        </p:spPr>
+      </p:pic>
+    </p:spTree>
+    <p:extLst>
+      <p:ext uri="{BB962C8B-B14F-4D97-AF65-F5344CB8AC3E}">
+        <p14:creationId xmlns:p14="http://schemas.microsoft.com/office/powerpoint/2010/main" val="4193803888"/>
+      </p:ext>
+    </p:extLst>
+  </p:cSld>
+  <p:clrMapOvr>
+    <a:masterClrMapping/>
+  </p:clrMapOvr>
+</p:sld>
+</file>
+
+<file path=ppt/slides/slide65.xml><?xml version="1.0" encoding="utf-8"?>
+<p:sld xmlns:a="http://schemas.openxmlformats.org/drawingml/2006/main" xmlns:r="http://schemas.openxmlformats.org/officeDocument/2006/relationships" xmlns:p="http://schemas.openxmlformats.org/presentationml/2006/main">
+  <p:cSld>
+    <p:spTree>
+      <p:nvGrpSpPr>
+        <p:cNvPr id="1" name=""/>
+        <p:cNvGrpSpPr/>
+        <p:nvPr/>
+      </p:nvGrpSpPr>
+      <p:grpSpPr>
+        <a:xfrm>
+          <a:off x="0" y="0"/>
+          <a:ext cx="0" cy="0"/>
+          <a:chOff x="0" y="0"/>
+          <a:chExt cx="0" cy="0"/>
+        </a:xfrm>
+      </p:grpSpPr>
+      <p:sp>
+        <p:nvSpPr>
+          <p:cNvPr id="2" name="Title 1">
+            <a:extLst>
+              <a:ext uri="{FF2B5EF4-FFF2-40B4-BE49-F238E27FC236}">
+                <a16:creationId xmlns:a16="http://schemas.microsoft.com/office/drawing/2014/main" id="{1F8717B5-F992-3362-0E17-84D889214116}"/>
+              </a:ext>
+            </a:extLst>
+          </p:cNvPr>
+          <p:cNvSpPr>
+            <a:spLocks noGrp="1"/>
+          </p:cNvSpPr>
+          <p:nvPr>
+            <p:ph type="title"/>
+          </p:nvPr>
+        </p:nvSpPr>
+        <p:spPr/>
+        <p:txBody>
+          <a:bodyPr>
+            <a:normAutofit/>
+          </a:bodyPr>
+          <a:lstStyle/>
+          <a:p>
+            <a:r>
+              <a:rPr lang="en-US" sz="2400" b="1" dirty="0"/>
+              <a:t>System-User Prompt Design</a:t>
+            </a:r>
+          </a:p>
+        </p:txBody>
+      </p:sp>
+      <p:sp>
+        <p:nvSpPr>
+          <p:cNvPr id="3" name="Content Placeholder 2">
+            <a:extLst>
+              <a:ext uri="{FF2B5EF4-FFF2-40B4-BE49-F238E27FC236}">
+                <a16:creationId xmlns:a16="http://schemas.microsoft.com/office/drawing/2014/main" id="{6A1CF6AE-4BFF-FA1F-6998-093945033E5D}"/>
+              </a:ext>
+            </a:extLst>
+          </p:cNvPr>
+          <p:cNvSpPr>
+            <a:spLocks noGrp="1"/>
+          </p:cNvSpPr>
+          <p:nvPr>
+            <p:ph idx="1"/>
+          </p:nvPr>
+        </p:nvSpPr>
+        <p:spPr/>
+        <p:txBody>
+          <a:bodyPr>
+            <a:normAutofit/>
+          </a:bodyPr>
+          <a:lstStyle/>
+          <a:p>
+            <a:r>
+              <a:rPr lang="en-US" sz="1800" dirty="0"/>
+              <a:t>Now we changed the input prompt to have system-user instruction.</a:t>
+            </a:r>
+          </a:p>
+          <a:p>
+            <a:endParaRPr lang="en-US" sz="1800" dirty="0"/>
+          </a:p>
+          <a:p>
+            <a:endParaRPr lang="en-US" sz="1800" dirty="0"/>
+          </a:p>
+          <a:p>
+            <a:endParaRPr lang="en-US" sz="1800" dirty="0"/>
+          </a:p>
+          <a:p>
+            <a:endParaRPr lang="en-US" sz="1800" dirty="0"/>
+          </a:p>
+          <a:p>
+            <a:endParaRPr lang="en-US" sz="1800" dirty="0"/>
+          </a:p>
+          <a:p>
+            <a:r>
+              <a:rPr lang="en-US" sz="1800" dirty="0"/>
+              <a:t>In a way that System prompt being in English language and the user prompt being in Persian language.</a:t>
+            </a:r>
+          </a:p>
+          <a:p>
+            <a:pPr lvl="1"/>
+            <a:r>
+              <a:rPr lang="en-US" sz="1400" dirty="0"/>
+              <a:t>This is due to the reason that the model can understand instructions better in English language and have a better reasoning in that situation.</a:t>
+            </a:r>
+          </a:p>
+        </p:txBody>
+      </p:sp>
+      <p:pic>
+        <p:nvPicPr>
+          <p:cNvPr id="6" name="Picture 5">
+            <a:extLst>
+              <a:ext uri="{FF2B5EF4-FFF2-40B4-BE49-F238E27FC236}">
+                <a16:creationId xmlns:a16="http://schemas.microsoft.com/office/drawing/2014/main" id="{A8049A73-01B7-E850-3721-97C30BC6E0AA}"/>
+              </a:ext>
+            </a:extLst>
+          </p:cNvPr>
+          <p:cNvPicPr>
+            <a:picLocks noChangeAspect="1"/>
+          </p:cNvPicPr>
+          <p:nvPr/>
+        </p:nvPicPr>
+        <p:blipFill>
+          <a:blip r:embed="rId3"/>
+          <a:stretch>
+            <a:fillRect/>
+          </a:stretch>
+        </p:blipFill>
+        <p:spPr>
+          <a:xfrm>
+            <a:off x="1616423" y="2633419"/>
+            <a:ext cx="8959154" cy="920381"/>
+          </a:xfrm>
+          <a:prstGeom prst="rect">
+            <a:avLst/>
+          </a:prstGeom>
+        </p:spPr>
+      </p:pic>
+    </p:spTree>
+    <p:extLst>
+      <p:ext uri="{BB962C8B-B14F-4D97-AF65-F5344CB8AC3E}">
+        <p14:creationId xmlns:p14="http://schemas.microsoft.com/office/powerpoint/2010/main" val="4145746751"/>
+      </p:ext>
+    </p:extLst>
+  </p:cSld>
+  <p:clrMapOvr>
+    <a:masterClrMapping/>
+  </p:clrMapOvr>
+</p:sld>
+</file>
+
+<file path=ppt/slides/slide66.xml><?xml version="1.0" encoding="utf-8"?>
+<p:sld xmlns:a="http://schemas.openxmlformats.org/drawingml/2006/main" xmlns:r="http://schemas.openxmlformats.org/officeDocument/2006/relationships" xmlns:p="http://schemas.openxmlformats.org/presentationml/2006/main">
+  <p:cSld>
+    <p:spTree>
+      <p:nvGrpSpPr>
+        <p:cNvPr id="1" name=""/>
+        <p:cNvGrpSpPr/>
+        <p:nvPr/>
+      </p:nvGrpSpPr>
+      <p:grpSpPr>
+        <a:xfrm>
+          <a:off x="0" y="0"/>
+          <a:ext cx="0" cy="0"/>
+          <a:chOff x="0" y="0"/>
+          <a:chExt cx="0" cy="0"/>
+        </a:xfrm>
+      </p:grpSpPr>
+      <p:sp>
+        <p:nvSpPr>
+          <p:cNvPr id="2" name="Title 1">
+            <a:extLst>
+              <a:ext uri="{FF2B5EF4-FFF2-40B4-BE49-F238E27FC236}">
+                <a16:creationId xmlns:a16="http://schemas.microsoft.com/office/drawing/2014/main" id="{1F8717B5-F992-3362-0E17-84D889214116}"/>
+              </a:ext>
+            </a:extLst>
+          </p:cNvPr>
+          <p:cNvSpPr>
+            <a:spLocks noGrp="1"/>
+          </p:cNvSpPr>
+          <p:nvPr>
+            <p:ph type="title"/>
+          </p:nvPr>
+        </p:nvSpPr>
+        <p:spPr/>
+        <p:txBody>
+          <a:bodyPr>
+            <a:normAutofit/>
+          </a:bodyPr>
+          <a:lstStyle/>
+          <a:p>
+            <a:r>
+              <a:rPr lang="en-US" sz="2400" b="1" dirty="0"/>
+              <a:t>System-User Prompt Design</a:t>
+            </a:r>
+          </a:p>
+        </p:txBody>
+      </p:sp>
+      <p:sp>
+        <p:nvSpPr>
+          <p:cNvPr id="3" name="Content Placeholder 2">
+            <a:extLst>
+              <a:ext uri="{FF2B5EF4-FFF2-40B4-BE49-F238E27FC236}">
+                <a16:creationId xmlns:a16="http://schemas.microsoft.com/office/drawing/2014/main" id="{6A1CF6AE-4BFF-FA1F-6998-093945033E5D}"/>
+              </a:ext>
+            </a:extLst>
+          </p:cNvPr>
+          <p:cNvSpPr>
+            <a:spLocks noGrp="1"/>
+          </p:cNvSpPr>
+          <p:nvPr>
+            <p:ph idx="1"/>
+          </p:nvPr>
+        </p:nvSpPr>
+        <p:spPr>
+          <a:xfrm>
+            <a:off x="838200" y="1825625"/>
+            <a:ext cx="10515600" cy="4667250"/>
+          </a:xfrm>
+        </p:spPr>
+        <p:txBody>
+          <a:bodyPr>
+            <a:normAutofit fontScale="92500" lnSpcReduction="10000"/>
+          </a:bodyPr>
+          <a:lstStyle/>
+          <a:p>
+            <a:r>
+              <a:rPr lang="en-US" sz="1800" dirty="0"/>
+              <a:t>This the result form Gemma2 9b it for changed prompt:</a:t>
+            </a:r>
+          </a:p>
+          <a:p>
+            <a:endParaRPr lang="en-US" sz="1800" dirty="0"/>
+          </a:p>
+          <a:p>
+            <a:endParaRPr lang="en-US" sz="1800" dirty="0"/>
+          </a:p>
+          <a:p>
+            <a:endParaRPr lang="en-US" sz="1800" dirty="0"/>
+          </a:p>
+          <a:p>
+            <a:endParaRPr lang="en-US" sz="1800" dirty="0"/>
+          </a:p>
+          <a:p>
+            <a:endParaRPr lang="en-US" sz="1800" dirty="0"/>
+          </a:p>
+          <a:p>
+            <a:endParaRPr lang="en-US" sz="1800" dirty="0"/>
+          </a:p>
+          <a:p>
+            <a:endParaRPr lang="en-US" sz="1800" dirty="0"/>
+          </a:p>
+          <a:p>
+            <a:endParaRPr lang="en-US" sz="1800" dirty="0"/>
+          </a:p>
+          <a:p>
+            <a:endParaRPr lang="en-US" sz="1800" dirty="0"/>
+          </a:p>
+          <a:p>
+            <a:pPr marL="0" indent="0">
+              <a:buNone/>
+            </a:pPr>
+            <a:endParaRPr lang="en-US" sz="1800" dirty="0"/>
+          </a:p>
+          <a:p>
+            <a:endParaRPr lang="en-US" sz="1800" dirty="0"/>
+          </a:p>
+          <a:p>
+            <a:endParaRPr lang="en-US" sz="1800" dirty="0"/>
+          </a:p>
+          <a:p>
+            <a:r>
+              <a:rPr lang="en-US" sz="1800" dirty="0"/>
+              <a:t>Not only the reference time was 2x faster, but also the results became more natural and enhanced.</a:t>
+            </a:r>
+          </a:p>
+        </p:txBody>
+      </p:sp>
+      <p:pic>
+        <p:nvPicPr>
+          <p:cNvPr id="8" name="Picture 7">
+            <a:extLst>
+              <a:ext uri="{FF2B5EF4-FFF2-40B4-BE49-F238E27FC236}">
+                <a16:creationId xmlns:a16="http://schemas.microsoft.com/office/drawing/2014/main" id="{0A80AAC9-56F0-645B-610F-2916F64CB78C}"/>
+              </a:ext>
+            </a:extLst>
+          </p:cNvPr>
+          <p:cNvPicPr>
+            <a:picLocks noChangeAspect="1"/>
+          </p:cNvPicPr>
+          <p:nvPr/>
+        </p:nvPicPr>
+        <p:blipFill>
+          <a:blip r:embed="rId3"/>
+          <a:stretch>
+            <a:fillRect/>
+          </a:stretch>
+        </p:blipFill>
+        <p:spPr>
+          <a:xfrm>
+            <a:off x="1333254" y="2373684"/>
+            <a:ext cx="9173497" cy="3532588"/>
+          </a:xfrm>
+          <a:prstGeom prst="rect">
+            <a:avLst/>
+          </a:prstGeom>
+        </p:spPr>
+      </p:pic>
+    </p:spTree>
+    <p:extLst>
+      <p:ext uri="{BB962C8B-B14F-4D97-AF65-F5344CB8AC3E}">
+        <p14:creationId xmlns:p14="http://schemas.microsoft.com/office/powerpoint/2010/main" val="4207476130"/>
+      </p:ext>
+    </p:extLst>
+  </p:cSld>
+  <p:clrMapOvr>
+    <a:masterClrMapping/>
+  </p:clrMapOvr>
+</p:sld>
+</file>
+
+<file path=ppt/slides/slide67.xml><?xml version="1.0" encoding="utf-8"?>
+<p:sld xmlns:a="http://schemas.openxmlformats.org/drawingml/2006/main" xmlns:r="http://schemas.openxmlformats.org/officeDocument/2006/relationships" xmlns:p="http://schemas.openxmlformats.org/presentationml/2006/main">
+  <p:cSld>
+    <p:spTree>
+      <p:nvGrpSpPr>
+        <p:cNvPr id="1" name=""/>
+        <p:cNvGrpSpPr/>
+        <p:nvPr/>
+      </p:nvGrpSpPr>
+      <p:grpSpPr>
+        <a:xfrm>
+          <a:off x="0" y="0"/>
+          <a:ext cx="0" cy="0"/>
+          <a:chOff x="0" y="0"/>
+          <a:chExt cx="0" cy="0"/>
+        </a:xfrm>
+      </p:grpSpPr>
+      <p:sp>
+        <p:nvSpPr>
+          <p:cNvPr id="2" name="Title 1">
+            <a:extLst>
+              <a:ext uri="{FF2B5EF4-FFF2-40B4-BE49-F238E27FC236}">
+                <a16:creationId xmlns:a16="http://schemas.microsoft.com/office/drawing/2014/main" id="{1F8717B5-F992-3362-0E17-84D889214116}"/>
+              </a:ext>
+            </a:extLst>
+          </p:cNvPr>
+          <p:cNvSpPr>
+            <a:spLocks noGrp="1"/>
+          </p:cNvSpPr>
+          <p:nvPr>
+            <p:ph type="title"/>
+          </p:nvPr>
+        </p:nvSpPr>
+        <p:spPr/>
+        <p:txBody>
+          <a:bodyPr>
+            <a:normAutofit/>
+          </a:bodyPr>
+          <a:lstStyle/>
+          <a:p>
+            <a:r>
+              <a:rPr lang="en-US" sz="2400" b="1" dirty="0"/>
+              <a:t>System-User Prompt Design</a:t>
+            </a:r>
+          </a:p>
+        </p:txBody>
+      </p:sp>
+      <p:sp>
+        <p:nvSpPr>
+          <p:cNvPr id="3" name="Content Placeholder 2">
+            <a:extLst>
+              <a:ext uri="{FF2B5EF4-FFF2-40B4-BE49-F238E27FC236}">
+                <a16:creationId xmlns:a16="http://schemas.microsoft.com/office/drawing/2014/main" id="{6A1CF6AE-4BFF-FA1F-6998-093945033E5D}"/>
+              </a:ext>
+            </a:extLst>
+          </p:cNvPr>
+          <p:cNvSpPr>
+            <a:spLocks noGrp="1"/>
+          </p:cNvSpPr>
+          <p:nvPr>
+            <p:ph idx="1"/>
+          </p:nvPr>
+        </p:nvSpPr>
+        <p:spPr/>
+        <p:txBody>
+          <a:bodyPr>
+            <a:normAutofit/>
+          </a:bodyPr>
+          <a:lstStyle/>
+          <a:p>
+            <a:r>
+              <a:rPr lang="en-US" sz="1800" dirty="0"/>
+              <a:t>As the result of the little experience conducted, it is worthwhile to test the system-user prompt design with system prompt being in English (including the k-shot examples in Farsi) and the user prompt being the same.</a:t>
+            </a:r>
+          </a:p>
+          <a:p>
+            <a:r>
+              <a:rPr lang="en-US" sz="1800" dirty="0"/>
+              <a:t>In that case it is feasible to not repeat the instructions due to the better understanding of the model.</a:t>
+            </a:r>
+          </a:p>
+        </p:txBody>
+      </p:sp>
+    </p:spTree>
+    <p:extLst>
+      <p:ext uri="{BB962C8B-B14F-4D97-AF65-F5344CB8AC3E}">
+        <p14:creationId xmlns:p14="http://schemas.microsoft.com/office/powerpoint/2010/main" val="736721920"/>
       </p:ext>
     </p:extLst>
   </p:cSld>

</xml_diff>